<commit_message>
edited slides and added relevant links
</commit_message>
<xml_diff>
--- a/ML-AI - What our eyes can tell us.pptx
+++ b/ML-AI - What our eyes can tell us.pptx
@@ -884,8 +884,35 @@
           <a:lstStyle/>
           <a:p>
             <a:pPr indent="0" lvl="0" marL="0" rtl="0" algn="l">
-              <a:spcBef>
-                <a:spcPts val="0"/>
+              <a:lnSpc>
+                <a:spcPct val="115000"/>
+              </a:lnSpc>
+              <a:spcBef>
+                <a:spcPts val="1200"/>
+              </a:spcBef>
+              <a:spcAft>
+                <a:spcPts val="0"/>
+              </a:spcAft>
+              <a:buNone/>
+            </a:pPr>
+            <a:r>
+              <a:rPr lang="es-419" sz="1000">
+                <a:solidFill>
+                  <a:schemeClr val="dk1"/>
+                </a:solidFill>
+              </a:rPr>
+              <a:t>What does this image tell you? To me, it says ‘that’s an eye’; for doctors, it’s says ‘indeed, it’s a retinal photo’. But for Google’s AI, it says that this eye is from a DFAB patient. </a:t>
+            </a:r>
+            <a:endParaRPr sz="1000">
+              <a:solidFill>
+                <a:schemeClr val="dk1"/>
+              </a:solidFill>
+            </a:endParaRPr>
+          </a:p>
+          <a:p>
+            <a:pPr indent="0" lvl="0" marL="0" rtl="0" algn="l">
+              <a:spcBef>
+                <a:spcPts val="1200"/>
               </a:spcBef>
               <a:spcAft>
                 <a:spcPts val="0"/>
@@ -982,17 +1009,60 @@
           </a:bodyPr>
           <a:lstStyle/>
           <a:p>
-            <a:pPr indent="0" lvl="0" marL="0" rtl="0" algn="l">
-              <a:spcBef>
-                <a:spcPts val="0"/>
-              </a:spcBef>
-              <a:spcAft>
-                <a:spcPts val="0"/>
-              </a:spcAft>
-              <a:buNone/>
+            <a:pPr indent="-292100" lvl="0" marL="457200" rtl="0" algn="l">
+              <a:lnSpc>
+                <a:spcPct val="115000"/>
+              </a:lnSpc>
+              <a:spcBef>
+                <a:spcPts val="1200"/>
+              </a:spcBef>
+              <a:spcAft>
+                <a:spcPts val="0"/>
+              </a:spcAft>
+              <a:buClr>
+                <a:schemeClr val="dk1"/>
+              </a:buClr>
+              <a:buSzPts val="1000"/>
+              <a:buChar char="●"/>
             </a:pPr>
             <a:r>
-              <a:t/>
+              <a:rPr lang="es-419" sz="1000">
+                <a:solidFill>
+                  <a:schemeClr val="dk1"/>
+                </a:solidFill>
+              </a:rPr>
+              <a:t>This AI has somehow connected patterns that are too subtle to the human eye, trained to expertise or not, to distinguish gender assigned at birth.</a:t>
+            </a:r>
+            <a:endParaRPr sz="1000">
+              <a:solidFill>
+                <a:schemeClr val="dk1"/>
+              </a:solidFill>
+            </a:endParaRPr>
+          </a:p>
+          <a:p>
+            <a:pPr indent="-292100" lvl="1" marL="914400" rtl="0" algn="l">
+              <a:lnSpc>
+                <a:spcPct val="115000"/>
+              </a:lnSpc>
+              <a:spcBef>
+                <a:spcPts val="0"/>
+              </a:spcBef>
+              <a:spcAft>
+                <a:spcPts val="0"/>
+              </a:spcAft>
+              <a:buClr>
+                <a:schemeClr val="dk1"/>
+              </a:buClr>
+              <a:buSzPts val="1000"/>
+              <a:buChar char="●"/>
+            </a:pPr>
+            <a:r>
+              <a:rPr lang="es-419" sz="1000">
+                <a:solidFill>
+                  <a:schemeClr val="dk1"/>
+                </a:solidFill>
+              </a:rPr>
+              <a:t>Now why do I say it like that? Because this is something that doctors can only guess at - the AI has an AUC (Area under the ROC Curve) of 0.97 - means the classifier can detect more numbers of True positives and True negatives.</a:t>
             </a:r>
             <a:endParaRPr/>
           </a:p>
@@ -1081,9 +1151,180 @@
           </a:bodyPr>
           <a:lstStyle/>
           <a:p>
+            <a:pPr indent="-292100" lvl="0" marL="457200" rtl="0" algn="l">
+              <a:lnSpc>
+                <a:spcPct val="115000"/>
+              </a:lnSpc>
+              <a:spcBef>
+                <a:spcPts val="1200"/>
+              </a:spcBef>
+              <a:spcAft>
+                <a:spcPts val="0"/>
+              </a:spcAft>
+              <a:buClr>
+                <a:schemeClr val="dk1"/>
+              </a:buClr>
+              <a:buSzPts val="1000"/>
+              <a:buChar char="●"/>
+            </a:pPr>
+            <a:r>
+              <a:rPr lang="es-419" sz="1000">
+                <a:solidFill>
+                  <a:schemeClr val="dk1"/>
+                </a:solidFill>
+              </a:rPr>
+              <a:t>This AI uses </a:t>
+            </a:r>
+            <a:r>
+              <a:rPr i="1" lang="es-419" sz="1000">
+                <a:solidFill>
+                  <a:schemeClr val="dk1"/>
+                </a:solidFill>
+              </a:rPr>
+              <a:t>convolutional neural network</a:t>
+            </a:r>
+            <a:r>
+              <a:rPr lang="es-419" sz="1000">
+                <a:solidFill>
+                  <a:schemeClr val="dk1"/>
+                </a:solidFill>
+              </a:rPr>
+              <a:t>. It’s a specific type of neural network optimised for image classification, the same technique that Google uses to label millions of Web images. Deep Learning, a machine learning technique that uses neural networks to model very complex functions, is their way to train it. </a:t>
+            </a:r>
+            <a:endParaRPr sz="1000">
+              <a:solidFill>
+                <a:schemeClr val="dk1"/>
+              </a:solidFill>
+            </a:endParaRPr>
+          </a:p>
+          <a:p>
+            <a:pPr indent="-292100" lvl="0" marL="457200" rtl="0" algn="l">
+              <a:lnSpc>
+                <a:spcPct val="115000"/>
+              </a:lnSpc>
+              <a:spcBef>
+                <a:spcPts val="0"/>
+              </a:spcBef>
+              <a:spcAft>
+                <a:spcPts val="0"/>
+              </a:spcAft>
+              <a:buClr>
+                <a:schemeClr val="dk1"/>
+              </a:buClr>
+              <a:buSzPts val="1000"/>
+              <a:buChar char="●"/>
+            </a:pPr>
+            <a:r>
+              <a:rPr lang="es-419" sz="1000">
+                <a:solidFill>
+                  <a:schemeClr val="dk1"/>
+                </a:solidFill>
+              </a:rPr>
+              <a:t>The model “looks at” generally random areas in the eye that help it make a most accurate gender prediction.</a:t>
+            </a:r>
+            <a:endParaRPr sz="1000">
+              <a:solidFill>
+                <a:schemeClr val="dk1"/>
+              </a:solidFill>
+            </a:endParaRPr>
+          </a:p>
+          <a:p>
+            <a:pPr indent="-292100" lvl="1" marL="914400" rtl="0" algn="l">
+              <a:lnSpc>
+                <a:spcPct val="115000"/>
+              </a:lnSpc>
+              <a:spcBef>
+                <a:spcPts val="0"/>
+              </a:spcBef>
+              <a:spcAft>
+                <a:spcPts val="0"/>
+              </a:spcAft>
+              <a:buClr>
+                <a:schemeClr val="dk1"/>
+              </a:buClr>
+              <a:buSzPts val="1000"/>
+              <a:buAutoNum type="alphaLcPeriod"/>
+            </a:pPr>
+            <a:r>
+              <a:rPr lang="es-419" sz="1000">
+                <a:solidFill>
+                  <a:schemeClr val="dk1"/>
+                </a:solidFill>
+              </a:rPr>
+              <a:t>What does it look at? Just about everything, and nothing at all.</a:t>
+            </a:r>
+            <a:endParaRPr sz="1000">
+              <a:solidFill>
+                <a:schemeClr val="dk1"/>
+              </a:solidFill>
+            </a:endParaRPr>
+          </a:p>
+          <a:p>
+            <a:pPr indent="-292100" lvl="1" marL="914400" rtl="0" algn="l">
+              <a:lnSpc>
+                <a:spcPct val="115000"/>
+              </a:lnSpc>
+              <a:spcBef>
+                <a:spcPts val="0"/>
+              </a:spcBef>
+              <a:spcAft>
+                <a:spcPts val="0"/>
+              </a:spcAft>
+              <a:buClr>
+                <a:schemeClr val="dk1"/>
+              </a:buClr>
+              <a:buSzPts val="1000"/>
+              <a:buAutoNum type="alphaLcPeriod"/>
+            </a:pPr>
+            <a:r>
+              <a:rPr lang="es-419" sz="1000">
+                <a:solidFill>
+                  <a:schemeClr val="dk1"/>
+                </a:solidFill>
+              </a:rPr>
+              <a:t>100 heat maps (like the one we saw at the beginning) were randomly selected and interpreted by professionals - and they found that areas like the vessels and optic disc were most highlighted with over 70% of cases, and around 50% non-specific areas.</a:t>
+            </a:r>
+            <a:endParaRPr sz="1000">
+              <a:solidFill>
+                <a:schemeClr val="dk1"/>
+              </a:solidFill>
+            </a:endParaRPr>
+          </a:p>
+          <a:p>
+            <a:pPr indent="-292100" lvl="1" marL="914400" rtl="0" algn="l">
+              <a:lnSpc>
+                <a:spcPct val="115000"/>
+              </a:lnSpc>
+              <a:spcBef>
+                <a:spcPts val="0"/>
+              </a:spcBef>
+              <a:spcAft>
+                <a:spcPts val="0"/>
+              </a:spcAft>
+              <a:buClr>
+                <a:schemeClr val="dk1"/>
+              </a:buClr>
+              <a:buSzPts val="1000"/>
+              <a:buAutoNum type="alphaLcPeriod"/>
+            </a:pPr>
+            <a:r>
+              <a:rPr lang="es-419" sz="1000">
+                <a:solidFill>
+                  <a:schemeClr val="dk1"/>
+                </a:solidFill>
+              </a:rPr>
+              <a:t>So it was looking at what doctors thought was random, but these helped the AI be as accurate as possible.</a:t>
+            </a:r>
+            <a:endParaRPr sz="1000">
+              <a:solidFill>
+                <a:schemeClr val="dk1"/>
+              </a:solidFill>
+            </a:endParaRPr>
+          </a:p>
+          <a:p>
             <a:pPr indent="0" lvl="0" marL="0" rtl="0" algn="l">
               <a:spcBef>
-                <a:spcPts val="0"/>
+                <a:spcPts val="1200"/>
               </a:spcBef>
               <a:spcAft>
                 <a:spcPts val="0"/>
@@ -1180,9 +1421,211 @@
           </a:bodyPr>
           <a:lstStyle/>
           <a:p>
+            <a:pPr indent="-292100" lvl="0" marL="457200" rtl="0" algn="l">
+              <a:lnSpc>
+                <a:spcPct val="115000"/>
+              </a:lnSpc>
+              <a:spcBef>
+                <a:spcPts val="1200"/>
+              </a:spcBef>
+              <a:spcAft>
+                <a:spcPts val="0"/>
+              </a:spcAft>
+              <a:buClr>
+                <a:schemeClr val="dk1"/>
+              </a:buClr>
+              <a:buSzPts val="1000"/>
+              <a:buChar char="●"/>
+            </a:pPr>
+            <a:r>
+              <a:rPr lang="es-419" sz="1000">
+                <a:solidFill>
+                  <a:schemeClr val="dk1"/>
+                </a:solidFill>
+              </a:rPr>
+              <a:t>Now this stems from a major model collaboration between US and India experts and hospitals, which was reviewed from 2018 up until this year for the initial purpose of aiding in </a:t>
+            </a:r>
+            <a:r>
+              <a:rPr b="1" i="1" lang="es-419" sz="1000">
+                <a:solidFill>
+                  <a:schemeClr val="dk1"/>
+                </a:solidFill>
+              </a:rPr>
+              <a:t>Diabetic Retinopathy diagnosis.</a:t>
+            </a:r>
+            <a:endParaRPr b="1" i="1" sz="1000">
+              <a:solidFill>
+                <a:schemeClr val="dk1"/>
+              </a:solidFill>
+            </a:endParaRPr>
+          </a:p>
+          <a:p>
+            <a:pPr indent="-292100" lvl="1" marL="914400" rtl="0" algn="l">
+              <a:lnSpc>
+                <a:spcPct val="115000"/>
+              </a:lnSpc>
+              <a:spcBef>
+                <a:spcPts val="0"/>
+              </a:spcBef>
+              <a:spcAft>
+                <a:spcPts val="0"/>
+              </a:spcAft>
+              <a:buClr>
+                <a:schemeClr val="dk1"/>
+              </a:buClr>
+              <a:buSzPts val="1000"/>
+              <a:buChar char="●"/>
+            </a:pPr>
+            <a:r>
+              <a:rPr lang="es-419" sz="1000">
+                <a:solidFill>
+                  <a:schemeClr val="dk1"/>
+                </a:solidFill>
+              </a:rPr>
+              <a:t>Between ophthalmologists review and prediction from the algorithm, it was debated and decided on final diagnosis.</a:t>
+            </a:r>
+            <a:endParaRPr sz="1000">
+              <a:solidFill>
+                <a:schemeClr val="dk1"/>
+              </a:solidFill>
+            </a:endParaRPr>
+          </a:p>
+          <a:p>
+            <a:pPr indent="-292100" lvl="0" marL="457200" rtl="0" algn="l">
+              <a:lnSpc>
+                <a:spcPct val="115000"/>
+              </a:lnSpc>
+              <a:spcBef>
+                <a:spcPts val="0"/>
+              </a:spcBef>
+              <a:spcAft>
+                <a:spcPts val="0"/>
+              </a:spcAft>
+              <a:buClr>
+                <a:schemeClr val="dk1"/>
+              </a:buClr>
+              <a:buSzPts val="1000"/>
+              <a:buChar char="●"/>
+            </a:pPr>
+            <a:r>
+              <a:rPr lang="es-419" sz="1000">
+                <a:solidFill>
+                  <a:schemeClr val="dk1"/>
+                </a:solidFill>
+              </a:rPr>
+              <a:t>On July 2018 results were published with a training dataset of 128K images, and 2 validation sets: 1) A random sample of </a:t>
+            </a:r>
+            <a:r>
+              <a:rPr b="1" lang="es-419" sz="1000">
+                <a:solidFill>
+                  <a:schemeClr val="dk1"/>
+                </a:solidFill>
+              </a:rPr>
+              <a:t>9963</a:t>
+            </a:r>
+            <a:r>
+              <a:rPr lang="es-419" sz="1000">
+                <a:solidFill>
+                  <a:schemeClr val="dk1"/>
+                </a:solidFill>
+              </a:rPr>
+              <a:t> images not overlapping with the previous training set. 2) A publicly available data set with </a:t>
+            </a:r>
+            <a:r>
+              <a:rPr b="1" lang="es-419" sz="1000">
+                <a:solidFill>
+                  <a:schemeClr val="dk1"/>
+                </a:solidFill>
+              </a:rPr>
+              <a:t>1748</a:t>
+            </a:r>
+            <a:r>
+              <a:rPr lang="es-419" sz="1000">
+                <a:solidFill>
+                  <a:schemeClr val="dk1"/>
+                </a:solidFill>
+              </a:rPr>
+              <a:t> images.</a:t>
+            </a:r>
+            <a:endParaRPr sz="1000">
+              <a:solidFill>
+                <a:schemeClr val="dk1"/>
+              </a:solidFill>
+            </a:endParaRPr>
+          </a:p>
+          <a:p>
+            <a:pPr indent="-292100" lvl="1" marL="914400" rtl="0" algn="l">
+              <a:lnSpc>
+                <a:spcPct val="115000"/>
+              </a:lnSpc>
+              <a:spcBef>
+                <a:spcPts val="0"/>
+              </a:spcBef>
+              <a:spcAft>
+                <a:spcPts val="0"/>
+              </a:spcAft>
+              <a:buClr>
+                <a:schemeClr val="dk1"/>
+              </a:buClr>
+              <a:buSzPts val="1000"/>
+              <a:buChar char="●"/>
+            </a:pPr>
+            <a:r>
+              <a:rPr lang="es-419" sz="1000">
+                <a:solidFill>
+                  <a:schemeClr val="dk1"/>
+                </a:solidFill>
+              </a:rPr>
+              <a:t>The model worked insanely well. It had a </a:t>
+            </a:r>
+            <a:r>
+              <a:rPr b="1" lang="es-419" sz="1000">
+                <a:solidFill>
+                  <a:schemeClr val="dk1"/>
+                </a:solidFill>
+              </a:rPr>
+              <a:t>96–97% sensitivity and 93% specificity</a:t>
+            </a:r>
+            <a:r>
+              <a:rPr lang="es-419" sz="1000">
+                <a:solidFill>
+                  <a:schemeClr val="dk1"/>
+                </a:solidFill>
+              </a:rPr>
+              <a:t>, helping them get as few false negatives as they could. </a:t>
+            </a:r>
+            <a:endParaRPr sz="1000">
+              <a:solidFill>
+                <a:schemeClr val="dk1"/>
+              </a:solidFill>
+            </a:endParaRPr>
+          </a:p>
+          <a:p>
             <a:pPr indent="0" lvl="0" marL="0" rtl="0" algn="l">
-              <a:spcBef>
-                <a:spcPts val="0"/>
+              <a:lnSpc>
+                <a:spcPct val="115000"/>
+              </a:lnSpc>
+              <a:spcBef>
+                <a:spcPts val="1200"/>
+              </a:spcBef>
+              <a:spcAft>
+                <a:spcPts val="0"/>
+              </a:spcAft>
+              <a:buNone/>
+            </a:pPr>
+            <a:r>
+              <a:t/>
+            </a:r>
+            <a:endParaRPr sz="1000">
+              <a:solidFill>
+                <a:schemeClr val="dk1"/>
+              </a:solidFill>
+            </a:endParaRPr>
+          </a:p>
+          <a:p>
+            <a:pPr indent="0" lvl="0" marL="0" rtl="0" algn="l">
+              <a:spcBef>
+                <a:spcPts val="1200"/>
               </a:spcBef>
               <a:spcAft>
                 <a:spcPts val="0"/>
@@ -1280,16 +1723,24 @@
           <a:lstStyle/>
           <a:p>
             <a:pPr indent="0" lvl="0" marL="0" rtl="0" algn="l">
-              <a:spcBef>
-                <a:spcPts val="0"/>
-              </a:spcBef>
-              <a:spcAft>
-                <a:spcPts val="0"/>
+              <a:lnSpc>
+                <a:spcPct val="115000"/>
+              </a:lnSpc>
+              <a:spcBef>
+                <a:spcPts val="1200"/>
+              </a:spcBef>
+              <a:spcAft>
+                <a:spcPts val="1200"/>
               </a:spcAft>
               <a:buNone/>
             </a:pPr>
             <a:r>
-              <a:t/>
+              <a:rPr lang="es-419" sz="1000">
+                <a:solidFill>
+                  <a:schemeClr val="dk1"/>
+                </a:solidFill>
+              </a:rPr>
+              <a:t>What’s the use of this? Right now, nothing. It’s not directly useful nor faster than reading your patient’s chart, but it doesn’t mean that this is useless information.</a:t>
             </a:r>
             <a:endParaRPr/>
           </a:p>
@@ -1379,8 +1830,35 @@
           <a:lstStyle/>
           <a:p>
             <a:pPr indent="0" lvl="0" marL="0" rtl="0" algn="l">
-              <a:spcBef>
-                <a:spcPts val="0"/>
+              <a:lnSpc>
+                <a:spcPct val="115000"/>
+              </a:lnSpc>
+              <a:spcBef>
+                <a:spcPts val="1200"/>
+              </a:spcBef>
+              <a:spcAft>
+                <a:spcPts val="0"/>
+              </a:spcAft>
+              <a:buNone/>
+            </a:pPr>
+            <a:r>
+              <a:rPr lang="es-419" sz="1000">
+                <a:solidFill>
+                  <a:schemeClr val="dk1"/>
+                </a:solidFill>
+              </a:rPr>
+              <a:t>it opens doors to our eyes’ anatomy that this branch in medicine did not think possible. The same way that stroke symptoms are presented differently by gender, investigating anatomy differences could help in a more personalised and efficient approach in diagnosis, making sure that we’re not leaving the human factor behind.</a:t>
+            </a:r>
+            <a:endParaRPr sz="1000">
+              <a:solidFill>
+                <a:schemeClr val="dk1"/>
+              </a:solidFill>
+            </a:endParaRPr>
+          </a:p>
+          <a:p>
+            <a:pPr indent="0" lvl="0" marL="0" rtl="0" algn="l">
+              <a:spcBef>
+                <a:spcPts val="1200"/>
               </a:spcBef>
               <a:spcAft>
                 <a:spcPts val="0"/>
@@ -1484,10 +1962,205 @@
               <a:spcAft>
                 <a:spcPts val="0"/>
               </a:spcAft>
+              <a:buClr>
+                <a:schemeClr val="dk1"/>
+              </a:buClr>
+              <a:buSzPts val="1100"/>
+              <a:buFont typeface="Arial"/>
               <a:buNone/>
             </a:pPr>
             <a:r>
-              <a:t/>
+              <a:rPr i="1" lang="es-419" sz="1200">
+                <a:solidFill>
+                  <a:schemeClr val="dk1"/>
+                </a:solidFill>
+                <a:latin typeface="Roboto"/>
+                <a:ea typeface="Roboto"/>
+                <a:cs typeface="Roboto"/>
+                <a:sym typeface="Roboto"/>
+              </a:rPr>
+              <a:t>Sources:</a:t>
+            </a:r>
+            <a:endParaRPr i="1" sz="1200">
+              <a:solidFill>
+                <a:schemeClr val="dk1"/>
+              </a:solidFill>
+              <a:latin typeface="Roboto"/>
+              <a:ea typeface="Roboto"/>
+              <a:cs typeface="Roboto"/>
+              <a:sym typeface="Roboto"/>
+            </a:endParaRPr>
+          </a:p>
+          <a:p>
+            <a:pPr indent="-298450" lvl="0" marL="457200" rtl="0" algn="l">
+              <a:spcBef>
+                <a:spcPts val="0"/>
+              </a:spcBef>
+              <a:spcAft>
+                <a:spcPts val="0"/>
+              </a:spcAft>
+              <a:buClr>
+                <a:schemeClr val="dk1"/>
+              </a:buClr>
+              <a:buSzPts val="1100"/>
+              <a:buFont typeface="Roboto"/>
+              <a:buChar char="-"/>
+            </a:pPr>
+            <a:r>
+              <a:rPr lang="es-419" u="sng">
+                <a:solidFill>
+                  <a:srgbClr val="009384"/>
+                </a:solidFill>
+                <a:latin typeface="Roboto"/>
+                <a:ea typeface="Roboto"/>
+                <a:cs typeface="Roboto"/>
+                <a:sym typeface="Roboto"/>
+                <a:hlinkClick r:id="rId2">
+                  <a:extLst>
+                    <a:ext uri="{A12FA001-AC4F-418D-AE19-62706E023703}">
+                      <ahyp:hlinkClr val="tx"/>
+                    </a:ext>
+                  </a:extLst>
+                </a:hlinkClick>
+              </a:rPr>
+              <a:t>Google’s AI can see through your eyes what doctors can’t</a:t>
+            </a:r>
+            <a:r>
+              <a:rPr b="1" lang="es-419">
+                <a:solidFill>
+                  <a:srgbClr val="242424"/>
+                </a:solidFill>
+                <a:highlight>
+                  <a:srgbClr val="FFFFFF"/>
+                </a:highlight>
+              </a:rPr>
+              <a:t> </a:t>
+            </a:r>
+            <a:endParaRPr b="1">
+              <a:solidFill>
+                <a:srgbClr val="242424"/>
+              </a:solidFill>
+              <a:highlight>
+                <a:srgbClr val="FFFFFF"/>
+              </a:highlight>
+            </a:endParaRPr>
+          </a:p>
+          <a:p>
+            <a:pPr indent="-298450" lvl="0" marL="457200" rtl="0" algn="l">
+              <a:spcBef>
+                <a:spcPts val="0"/>
+              </a:spcBef>
+              <a:spcAft>
+                <a:spcPts val="0"/>
+              </a:spcAft>
+              <a:buClr>
+                <a:schemeClr val="dk1"/>
+              </a:buClr>
+              <a:buSzPts val="1100"/>
+              <a:buFont typeface="Roboto"/>
+              <a:buChar char="-"/>
+            </a:pPr>
+            <a:r>
+              <a:rPr lang="es-419" u="sng">
+                <a:solidFill>
+                  <a:srgbClr val="009384"/>
+                </a:solidFill>
+                <a:highlight>
+                  <a:srgbClr val="FFFFFF"/>
+                </a:highlight>
+                <a:hlinkClick r:id="rId3">
+                  <a:extLst>
+                    <a:ext uri="{A12FA001-AC4F-418D-AE19-62706E023703}">
+                      <ahyp:hlinkClr val="tx"/>
+                    </a:ext>
+                  </a:extLst>
+                </a:hlinkClick>
+              </a:rPr>
+              <a:t>Deep Learning in Ophthalmology —How Google Did It</a:t>
+            </a:r>
+            <a:endParaRPr>
+              <a:solidFill>
+                <a:srgbClr val="242424"/>
+              </a:solidFill>
+              <a:highlight>
+                <a:srgbClr val="FFFFFF"/>
+              </a:highlight>
+            </a:endParaRPr>
+          </a:p>
+          <a:p>
+            <a:pPr indent="-298450" lvl="0" marL="457200" rtl="0" algn="l">
+              <a:spcBef>
+                <a:spcPts val="0"/>
+              </a:spcBef>
+              <a:spcAft>
+                <a:spcPts val="0"/>
+              </a:spcAft>
+              <a:buClr>
+                <a:srgbClr val="242424"/>
+              </a:buClr>
+              <a:buSzPts val="1100"/>
+              <a:buChar char="-"/>
+            </a:pPr>
+            <a:r>
+              <a:rPr lang="es-419" u="sng">
+                <a:solidFill>
+                  <a:srgbClr val="009384"/>
+                </a:solidFill>
+                <a:highlight>
+                  <a:srgbClr val="FFFFFF"/>
+                </a:highlight>
+                <a:hlinkClick r:id="rId4">
+                  <a:extLst>
+                    <a:ext uri="{A12FA001-AC4F-418D-AE19-62706E023703}">
+                      <ahyp:hlinkClr val="tx"/>
+                    </a:ext>
+                  </a:extLst>
+                </a:hlinkClick>
+              </a:rPr>
+              <a:t>Lessons learned from translating AI from development to deployment in healthcare</a:t>
+            </a:r>
+            <a:endParaRPr>
+              <a:solidFill>
+                <a:srgbClr val="242424"/>
+              </a:solidFill>
+              <a:highlight>
+                <a:srgbClr val="FFFFFF"/>
+              </a:highlight>
+            </a:endParaRPr>
+          </a:p>
+          <a:p>
+            <a:pPr indent="-298450" lvl="0" marL="457200" rtl="0" algn="l">
+              <a:spcBef>
+                <a:spcPts val="0"/>
+              </a:spcBef>
+              <a:spcAft>
+                <a:spcPts val="0"/>
+              </a:spcAft>
+              <a:buClr>
+                <a:schemeClr val="dk1"/>
+              </a:buClr>
+              <a:buSzPts val="1100"/>
+              <a:buFont typeface="Roboto"/>
+              <a:buChar char="-"/>
+            </a:pPr>
+            <a:r>
+              <a:rPr lang="es-419" u="sng">
+                <a:solidFill>
+                  <a:srgbClr val="009384"/>
+                </a:solidFill>
+                <a:latin typeface="Roboto"/>
+                <a:ea typeface="Roboto"/>
+                <a:cs typeface="Roboto"/>
+                <a:sym typeface="Roboto"/>
+                <a:hlinkClick r:id="rId5">
+                  <a:extLst>
+                    <a:ext uri="{A12FA001-AC4F-418D-AE19-62706E023703}">
+                      <ahyp:hlinkClr val="tx"/>
+                    </a:ext>
+                  </a:extLst>
+                </a:hlinkClick>
+              </a:rPr>
+              <a:t>Google’s AI to Revolutionize Healthcare: Eye Scan to Predict Heart Disease and more</a:t>
             </a:r>
             <a:endParaRPr/>
           </a:p>
@@ -8186,8 +8859,12 @@
               <a:buChar char="➔"/>
             </a:pPr>
             <a:r>
+              <a:rPr i="1" lang="es-419"/>
+              <a:t>Convolutional neural network,</a:t>
+            </a:r>
+            <a:r>
               <a:rPr lang="es-419"/>
-              <a:t>Convolutional neural network, optimised for image classification.</a:t>
+              <a:t> optimised for image classification.</a:t>
             </a:r>
             <a:endParaRPr/>
           </a:p>
@@ -8459,7 +9136,7 @@
                   <a:srgbClr val="000000"/>
                 </a:solidFill>
               </a:rPr>
-              <a:t>Comes from major model collab with US and India experts &amp; hospitals, with initial purpose of aiding </a:t>
+              <a:t>Comes from major collab with US and India experts &amp; hospitals, with initial purpose of aiding </a:t>
             </a:r>
             <a:r>
               <a:rPr i="1" lang="es-419" sz="1400">
@@ -8706,7 +9383,7 @@
                   <a:srgbClr val="000000"/>
                 </a:solidFill>
               </a:rPr>
-              <a:t>a random sample of almost 10K images </a:t>
+              <a:t>random sample of almost 10K images </a:t>
             </a:r>
             <a:endParaRPr sz="1400">
               <a:solidFill>
@@ -8738,7 +9415,7 @@
                   <a:srgbClr val="000000"/>
                 </a:solidFill>
               </a:rPr>
-              <a:t>and a public dataset of 1.7K images</a:t>
+              <a:t>public dataset of 1.7K images</a:t>
             </a:r>
             <a:endParaRPr sz="1400">
               <a:solidFill>
@@ -9227,6 +9904,285 @@
 </file>
 
 <file path=ppt/theme/theme1.xml><?xml version="1.0" encoding="utf-8"?>
+<a:theme xmlns:a="http://schemas.openxmlformats.org/drawingml/2006/main" xmlns:r="http://schemas.openxmlformats.org/officeDocument/2006/relationships">
+  <a:themeElements>
+    <a:clrScheme name="Default">
+      <a:dk1>
+        <a:srgbClr val="000000"/>
+      </a:dk1>
+      <a:lt1>
+        <a:srgbClr val="FFFFFF"/>
+      </a:lt1>
+      <a:dk2>
+        <a:srgbClr val="158158"/>
+      </a:dk2>
+      <a:lt2>
+        <a:srgbClr val="F3F3F3"/>
+      </a:lt2>
+      <a:accent1>
+        <a:srgbClr val="058DC7"/>
+      </a:accent1>
+      <a:accent2>
+        <a:srgbClr val="50B432"/>
+      </a:accent2>
+      <a:accent3>
+        <a:srgbClr val="ED561B"/>
+      </a:accent3>
+      <a:accent4>
+        <a:srgbClr val="EDEF00"/>
+      </a:accent4>
+      <a:accent5>
+        <a:srgbClr val="24CBE5"/>
+      </a:accent5>
+      <a:accent6>
+        <a:srgbClr val="64E572"/>
+      </a:accent6>
+      <a:hlink>
+        <a:srgbClr val="2200CC"/>
+      </a:hlink>
+      <a:folHlink>
+        <a:srgbClr val="551A8B"/>
+      </a:folHlink>
+    </a:clrScheme>
+    <a:fontScheme name="Office">
+      <a:majorFont>
+        <a:latin typeface="Arial"/>
+        <a:ea typeface=""/>
+        <a:cs typeface=""/>
+        <a:font script="Jpan" typeface="ＭＳ Ｐゴシック"/>
+        <a:font script="Hang" typeface="맑은 고딕"/>
+        <a:font script="Hans" typeface="宋体"/>
+        <a:font script="Hant" typeface="新細明體"/>
+        <a:font script="Arab" typeface="Times New Roman"/>
+        <a:font script="Hebr" typeface="Times New Roman"/>
+        <a:font script="Thai" typeface="Angsana New"/>
+        <a:font script="Ethi" typeface="Nyala"/>
+        <a:font script="Beng" typeface="Vrinda"/>
+        <a:font script="Gujr" typeface="Shruti"/>
+        <a:font script="Khmr" typeface="MoolBoran"/>
+        <a:font script="Knda" typeface="Tunga"/>
+        <a:font script="Guru" typeface="Raavi"/>
+        <a:font script="Cans" typeface="Euphemia"/>
+        <a:font script="Cher" typeface="Plantagenet Cherokee"/>
+        <a:font script="Yiii" typeface="Microsoft Yi Baiti"/>
+        <a:font script="Tibt" typeface="Microsoft Himalaya"/>
+        <a:font script="Thaa" typeface="MV Boli"/>
+        <a:font script="Deva" typeface="Mangal"/>
+        <a:font script="Telu" typeface="Gautami"/>
+        <a:font script="Taml" typeface="Latha"/>
+        <a:font script="Syrc" typeface="Estrangelo Edessa"/>
+        <a:font script="Orya" typeface="Kalinga"/>
+        <a:font script="Mlym" typeface="Kartika"/>
+        <a:font script="Laoo" typeface="DokChampa"/>
+        <a:font script="Sinh" typeface="Iskoola Pota"/>
+        <a:font script="Mong" typeface="Mongolian Baiti"/>
+        <a:font script="Viet" typeface="Times New Roman"/>
+        <a:font script="Uigh" typeface="Microsoft Uighur"/>
+        <a:font script="Geor" typeface="Sylfaen"/>
+      </a:majorFont>
+      <a:minorFont>
+        <a:latin typeface="Arial"/>
+        <a:ea typeface=""/>
+        <a:cs typeface=""/>
+        <a:font script="Jpan" typeface="ＭＳ Ｐゴシック"/>
+        <a:font script="Hang" typeface="맑은 고딕"/>
+        <a:font script="Hans" typeface="宋体"/>
+        <a:font script="Hant" typeface="新細明體"/>
+        <a:font script="Arab" typeface="Arial"/>
+        <a:font script="Hebr" typeface="Arial"/>
+        <a:font script="Thai" typeface="Cordia New"/>
+        <a:font script="Ethi" typeface="Nyala"/>
+        <a:font script="Beng" typeface="Vrinda"/>
+        <a:font script="Gujr" typeface="Shruti"/>
+        <a:font script="Khmr" typeface="DaunPenh"/>
+        <a:font script="Knda" typeface="Tunga"/>
+        <a:font script="Guru" typeface="Raavi"/>
+        <a:font script="Cans" typeface="Euphemia"/>
+        <a:font script="Cher" typeface="Plantagenet Cherokee"/>
+        <a:font script="Yiii" typeface="Microsoft Yi Baiti"/>
+        <a:font script="Tibt" typeface="Microsoft Himalaya"/>
+        <a:font script="Thaa" typeface="MV Boli"/>
+        <a:font script="Deva" typeface="Mangal"/>
+        <a:font script="Telu" typeface="Gautami"/>
+        <a:font script="Taml" typeface="Latha"/>
+        <a:font script="Syrc" typeface="Estrangelo Edessa"/>
+        <a:font script="Orya" typeface="Kalinga"/>
+        <a:font script="Mlym" typeface="Kartika"/>
+        <a:font script="Laoo" typeface="DokChampa"/>
+        <a:font script="Sinh" typeface="Iskoola Pota"/>
+        <a:font script="Mong" typeface="Mongolian Baiti"/>
+        <a:font script="Viet" typeface="Arial"/>
+        <a:font script="Uigh" typeface="Microsoft Uighur"/>
+        <a:font script="Geor" typeface="Sylfaen"/>
+      </a:minorFont>
+    </a:fontScheme>
+    <a:fmtScheme name="Office">
+      <a:fillStyleLst>
+        <a:solidFill>
+          <a:schemeClr val="phClr"/>
+        </a:solidFill>
+        <a:gradFill rotWithShape="1">
+          <a:gsLst>
+            <a:gs pos="0">
+              <a:schemeClr val="phClr">
+                <a:tint val="50000"/>
+                <a:satMod val="300000"/>
+              </a:schemeClr>
+            </a:gs>
+            <a:gs pos="35000">
+              <a:schemeClr val="phClr">
+                <a:tint val="37000"/>
+                <a:satMod val="300000"/>
+              </a:schemeClr>
+            </a:gs>
+            <a:gs pos="100000">
+              <a:schemeClr val="phClr">
+                <a:tint val="15000"/>
+                <a:satMod val="350000"/>
+              </a:schemeClr>
+            </a:gs>
+          </a:gsLst>
+          <a:lin ang="16200000" scaled="1"/>
+        </a:gradFill>
+        <a:gradFill rotWithShape="1">
+          <a:gsLst>
+            <a:gs pos="0">
+              <a:schemeClr val="phClr">
+                <a:tint val="100000"/>
+                <a:shade val="100000"/>
+                <a:satMod val="130000"/>
+              </a:schemeClr>
+            </a:gs>
+            <a:gs pos="100000">
+              <a:schemeClr val="phClr">
+                <a:tint val="50000"/>
+                <a:shade val="100000"/>
+                <a:satMod val="350000"/>
+              </a:schemeClr>
+            </a:gs>
+          </a:gsLst>
+          <a:lin ang="16200000" scaled="0"/>
+        </a:gradFill>
+      </a:fillStyleLst>
+      <a:lnStyleLst>
+        <a:ln w="9525" cap="flat" cmpd="sng" algn="ctr">
+          <a:solidFill>
+            <a:schemeClr val="phClr">
+              <a:shade val="95000"/>
+              <a:satMod val="105000"/>
+            </a:schemeClr>
+          </a:solidFill>
+          <a:prstDash val="solid"/>
+        </a:ln>
+        <a:ln w="25400" cap="flat" cmpd="sng" algn="ctr">
+          <a:solidFill>
+            <a:schemeClr val="phClr"/>
+          </a:solidFill>
+          <a:prstDash val="solid"/>
+        </a:ln>
+        <a:ln w="38100" cap="flat" cmpd="sng" algn="ctr">
+          <a:solidFill>
+            <a:schemeClr val="phClr"/>
+          </a:solidFill>
+          <a:prstDash val="solid"/>
+        </a:ln>
+      </a:lnStyleLst>
+      <a:effectStyleLst>
+        <a:effectStyle>
+          <a:effectLst>
+            <a:outerShdw blurRad="40000" dist="20000" dir="5400000" rotWithShape="0">
+              <a:srgbClr val="000000">
+                <a:alpha val="38000"/>
+              </a:srgbClr>
+            </a:outerShdw>
+          </a:effectLst>
+        </a:effectStyle>
+        <a:effectStyle>
+          <a:effectLst>
+            <a:outerShdw blurRad="40000" dist="23000" dir="5400000" rotWithShape="0">
+              <a:srgbClr val="000000">
+                <a:alpha val="35000"/>
+              </a:srgbClr>
+            </a:outerShdw>
+          </a:effectLst>
+        </a:effectStyle>
+        <a:effectStyle>
+          <a:effectLst>
+            <a:outerShdw blurRad="40000" dist="23000" dir="5400000" rotWithShape="0">
+              <a:srgbClr val="000000">
+                <a:alpha val="35000"/>
+              </a:srgbClr>
+            </a:outerShdw>
+          </a:effectLst>
+          <a:scene3d>
+            <a:camera prst="orthographicFront">
+              <a:rot lat="0" lon="0" rev="0"/>
+            </a:camera>
+            <a:lightRig rig="threePt" dir="t">
+              <a:rot lat="0" lon="0" rev="1200000"/>
+            </a:lightRig>
+          </a:scene3d>
+          <a:sp3d>
+            <a:bevelT w="63500" h="25400"/>
+          </a:sp3d>
+        </a:effectStyle>
+      </a:effectStyleLst>
+      <a:bgFillStyleLst>
+        <a:solidFill>
+          <a:schemeClr val="phClr"/>
+        </a:solidFill>
+        <a:gradFill rotWithShape="1">
+          <a:gsLst>
+            <a:gs pos="0">
+              <a:schemeClr val="phClr">
+                <a:tint val="40000"/>
+                <a:satMod val="350000"/>
+              </a:schemeClr>
+            </a:gs>
+            <a:gs pos="40000">
+              <a:schemeClr val="phClr">
+                <a:tint val="45000"/>
+                <a:shade val="99000"/>
+                <a:satMod val="350000"/>
+              </a:schemeClr>
+            </a:gs>
+            <a:gs pos="100000">
+              <a:schemeClr val="phClr">
+                <a:shade val="20000"/>
+                <a:satMod val="255000"/>
+              </a:schemeClr>
+            </a:gs>
+          </a:gsLst>
+          <a:path path="circle">
+            <a:fillToRect l="50000" t="-80000" r="50000" b="180000"/>
+          </a:path>
+        </a:gradFill>
+        <a:gradFill rotWithShape="1">
+          <a:gsLst>
+            <a:gs pos="0">
+              <a:schemeClr val="phClr">
+                <a:tint val="80000"/>
+                <a:satMod val="300000"/>
+              </a:schemeClr>
+            </a:gs>
+            <a:gs pos="100000">
+              <a:schemeClr val="phClr">
+                <a:shade val="30000"/>
+                <a:satMod val="200000"/>
+              </a:schemeClr>
+            </a:gs>
+          </a:gsLst>
+          <a:path path="circle">
+            <a:fillToRect l="50000" t="50000" r="50000" b="50000"/>
+          </a:path>
+        </a:gradFill>
+      </a:bgFillStyleLst>
+    </a:fmtScheme>
+  </a:themeElements>
+</a:theme>
+</file>
+
+<file path=ppt/theme/theme2.xml><?xml version="1.0" encoding="utf-8"?>
 <a:theme xmlns:a="http://schemas.openxmlformats.org/drawingml/2006/main" xmlns:r="http://schemas.openxmlformats.org/officeDocument/2006/relationships" name="Paradigm">
   <a:themeElements>
     <a:clrScheme name="Paradigm">
@@ -9503,283 +10459,4 @@
     </a:fmtScheme>
   </a:themeElements>
 </a:theme>
-</file>
-
-<file path=ppt/theme/theme2.xml><?xml version="1.0" encoding="utf-8"?>
-<a:theme xmlns:a="http://schemas.openxmlformats.org/drawingml/2006/main" xmlns:r="http://schemas.openxmlformats.org/officeDocument/2006/relationships">
-  <a:themeElements>
-    <a:clrScheme name="Default">
-      <a:dk1>
-        <a:srgbClr val="000000"/>
-      </a:dk1>
-      <a:lt1>
-        <a:srgbClr val="FFFFFF"/>
-      </a:lt1>
-      <a:dk2>
-        <a:srgbClr val="158158"/>
-      </a:dk2>
-      <a:lt2>
-        <a:srgbClr val="F3F3F3"/>
-      </a:lt2>
-      <a:accent1>
-        <a:srgbClr val="058DC7"/>
-      </a:accent1>
-      <a:accent2>
-        <a:srgbClr val="50B432"/>
-      </a:accent2>
-      <a:accent3>
-        <a:srgbClr val="ED561B"/>
-      </a:accent3>
-      <a:accent4>
-        <a:srgbClr val="EDEF00"/>
-      </a:accent4>
-      <a:accent5>
-        <a:srgbClr val="24CBE5"/>
-      </a:accent5>
-      <a:accent6>
-        <a:srgbClr val="64E572"/>
-      </a:accent6>
-      <a:hlink>
-        <a:srgbClr val="2200CC"/>
-      </a:hlink>
-      <a:folHlink>
-        <a:srgbClr val="551A8B"/>
-      </a:folHlink>
-    </a:clrScheme>
-    <a:fontScheme name="Office">
-      <a:majorFont>
-        <a:latin typeface="Arial"/>
-        <a:ea typeface=""/>
-        <a:cs typeface=""/>
-        <a:font script="Jpan" typeface="ＭＳ Ｐゴシック"/>
-        <a:font script="Hang" typeface="맑은 고딕"/>
-        <a:font script="Hans" typeface="宋体"/>
-        <a:font script="Hant" typeface="新細明體"/>
-        <a:font script="Arab" typeface="Times New Roman"/>
-        <a:font script="Hebr" typeface="Times New Roman"/>
-        <a:font script="Thai" typeface="Angsana New"/>
-        <a:font script="Ethi" typeface="Nyala"/>
-        <a:font script="Beng" typeface="Vrinda"/>
-        <a:font script="Gujr" typeface="Shruti"/>
-        <a:font script="Khmr" typeface="MoolBoran"/>
-        <a:font script="Knda" typeface="Tunga"/>
-        <a:font script="Guru" typeface="Raavi"/>
-        <a:font script="Cans" typeface="Euphemia"/>
-        <a:font script="Cher" typeface="Plantagenet Cherokee"/>
-        <a:font script="Yiii" typeface="Microsoft Yi Baiti"/>
-        <a:font script="Tibt" typeface="Microsoft Himalaya"/>
-        <a:font script="Thaa" typeface="MV Boli"/>
-        <a:font script="Deva" typeface="Mangal"/>
-        <a:font script="Telu" typeface="Gautami"/>
-        <a:font script="Taml" typeface="Latha"/>
-        <a:font script="Syrc" typeface="Estrangelo Edessa"/>
-        <a:font script="Orya" typeface="Kalinga"/>
-        <a:font script="Mlym" typeface="Kartika"/>
-        <a:font script="Laoo" typeface="DokChampa"/>
-        <a:font script="Sinh" typeface="Iskoola Pota"/>
-        <a:font script="Mong" typeface="Mongolian Baiti"/>
-        <a:font script="Viet" typeface="Times New Roman"/>
-        <a:font script="Uigh" typeface="Microsoft Uighur"/>
-        <a:font script="Geor" typeface="Sylfaen"/>
-      </a:majorFont>
-      <a:minorFont>
-        <a:latin typeface="Arial"/>
-        <a:ea typeface=""/>
-        <a:cs typeface=""/>
-        <a:font script="Jpan" typeface="ＭＳ Ｐゴシック"/>
-        <a:font script="Hang" typeface="맑은 고딕"/>
-        <a:font script="Hans" typeface="宋体"/>
-        <a:font script="Hant" typeface="新細明體"/>
-        <a:font script="Arab" typeface="Arial"/>
-        <a:font script="Hebr" typeface="Arial"/>
-        <a:font script="Thai" typeface="Cordia New"/>
-        <a:font script="Ethi" typeface="Nyala"/>
-        <a:font script="Beng" typeface="Vrinda"/>
-        <a:font script="Gujr" typeface="Shruti"/>
-        <a:font script="Khmr" typeface="DaunPenh"/>
-        <a:font script="Knda" typeface="Tunga"/>
-        <a:font script="Guru" typeface="Raavi"/>
-        <a:font script="Cans" typeface="Euphemia"/>
-        <a:font script="Cher" typeface="Plantagenet Cherokee"/>
-        <a:font script="Yiii" typeface="Microsoft Yi Baiti"/>
-        <a:font script="Tibt" typeface="Microsoft Himalaya"/>
-        <a:font script="Thaa" typeface="MV Boli"/>
-        <a:font script="Deva" typeface="Mangal"/>
-        <a:font script="Telu" typeface="Gautami"/>
-        <a:font script="Taml" typeface="Latha"/>
-        <a:font script="Syrc" typeface="Estrangelo Edessa"/>
-        <a:font script="Orya" typeface="Kalinga"/>
-        <a:font script="Mlym" typeface="Kartika"/>
-        <a:font script="Laoo" typeface="DokChampa"/>
-        <a:font script="Sinh" typeface="Iskoola Pota"/>
-        <a:font script="Mong" typeface="Mongolian Baiti"/>
-        <a:font script="Viet" typeface="Arial"/>
-        <a:font script="Uigh" typeface="Microsoft Uighur"/>
-        <a:font script="Geor" typeface="Sylfaen"/>
-      </a:minorFont>
-    </a:fontScheme>
-    <a:fmtScheme name="Office">
-      <a:fillStyleLst>
-        <a:solidFill>
-          <a:schemeClr val="phClr"/>
-        </a:solidFill>
-        <a:gradFill rotWithShape="1">
-          <a:gsLst>
-            <a:gs pos="0">
-              <a:schemeClr val="phClr">
-                <a:tint val="50000"/>
-                <a:satMod val="300000"/>
-              </a:schemeClr>
-            </a:gs>
-            <a:gs pos="35000">
-              <a:schemeClr val="phClr">
-                <a:tint val="37000"/>
-                <a:satMod val="300000"/>
-              </a:schemeClr>
-            </a:gs>
-            <a:gs pos="100000">
-              <a:schemeClr val="phClr">
-                <a:tint val="15000"/>
-                <a:satMod val="350000"/>
-              </a:schemeClr>
-            </a:gs>
-          </a:gsLst>
-          <a:lin ang="16200000" scaled="1"/>
-        </a:gradFill>
-        <a:gradFill rotWithShape="1">
-          <a:gsLst>
-            <a:gs pos="0">
-              <a:schemeClr val="phClr">
-                <a:tint val="100000"/>
-                <a:shade val="100000"/>
-                <a:satMod val="130000"/>
-              </a:schemeClr>
-            </a:gs>
-            <a:gs pos="100000">
-              <a:schemeClr val="phClr">
-                <a:tint val="50000"/>
-                <a:shade val="100000"/>
-                <a:satMod val="350000"/>
-              </a:schemeClr>
-            </a:gs>
-          </a:gsLst>
-          <a:lin ang="16200000" scaled="0"/>
-        </a:gradFill>
-      </a:fillStyleLst>
-      <a:lnStyleLst>
-        <a:ln w="9525" cap="flat" cmpd="sng" algn="ctr">
-          <a:solidFill>
-            <a:schemeClr val="phClr">
-              <a:shade val="95000"/>
-              <a:satMod val="105000"/>
-            </a:schemeClr>
-          </a:solidFill>
-          <a:prstDash val="solid"/>
-        </a:ln>
-        <a:ln w="25400" cap="flat" cmpd="sng" algn="ctr">
-          <a:solidFill>
-            <a:schemeClr val="phClr"/>
-          </a:solidFill>
-          <a:prstDash val="solid"/>
-        </a:ln>
-        <a:ln w="38100" cap="flat" cmpd="sng" algn="ctr">
-          <a:solidFill>
-            <a:schemeClr val="phClr"/>
-          </a:solidFill>
-          <a:prstDash val="solid"/>
-        </a:ln>
-      </a:lnStyleLst>
-      <a:effectStyleLst>
-        <a:effectStyle>
-          <a:effectLst>
-            <a:outerShdw blurRad="40000" dist="20000" dir="5400000" rotWithShape="0">
-              <a:srgbClr val="000000">
-                <a:alpha val="38000"/>
-              </a:srgbClr>
-            </a:outerShdw>
-          </a:effectLst>
-        </a:effectStyle>
-        <a:effectStyle>
-          <a:effectLst>
-            <a:outerShdw blurRad="40000" dist="23000" dir="5400000" rotWithShape="0">
-              <a:srgbClr val="000000">
-                <a:alpha val="35000"/>
-              </a:srgbClr>
-            </a:outerShdw>
-          </a:effectLst>
-        </a:effectStyle>
-        <a:effectStyle>
-          <a:effectLst>
-            <a:outerShdw blurRad="40000" dist="23000" dir="5400000" rotWithShape="0">
-              <a:srgbClr val="000000">
-                <a:alpha val="35000"/>
-              </a:srgbClr>
-            </a:outerShdw>
-          </a:effectLst>
-          <a:scene3d>
-            <a:camera prst="orthographicFront">
-              <a:rot lat="0" lon="0" rev="0"/>
-            </a:camera>
-            <a:lightRig rig="threePt" dir="t">
-              <a:rot lat="0" lon="0" rev="1200000"/>
-            </a:lightRig>
-          </a:scene3d>
-          <a:sp3d>
-            <a:bevelT w="63500" h="25400"/>
-          </a:sp3d>
-        </a:effectStyle>
-      </a:effectStyleLst>
-      <a:bgFillStyleLst>
-        <a:solidFill>
-          <a:schemeClr val="phClr"/>
-        </a:solidFill>
-        <a:gradFill rotWithShape="1">
-          <a:gsLst>
-            <a:gs pos="0">
-              <a:schemeClr val="phClr">
-                <a:tint val="40000"/>
-                <a:satMod val="350000"/>
-              </a:schemeClr>
-            </a:gs>
-            <a:gs pos="40000">
-              <a:schemeClr val="phClr">
-                <a:tint val="45000"/>
-                <a:shade val="99000"/>
-                <a:satMod val="350000"/>
-              </a:schemeClr>
-            </a:gs>
-            <a:gs pos="100000">
-              <a:schemeClr val="phClr">
-                <a:shade val="20000"/>
-                <a:satMod val="255000"/>
-              </a:schemeClr>
-            </a:gs>
-          </a:gsLst>
-          <a:path path="circle">
-            <a:fillToRect l="50000" t="-80000" r="50000" b="180000"/>
-          </a:path>
-        </a:gradFill>
-        <a:gradFill rotWithShape="1">
-          <a:gsLst>
-            <a:gs pos="0">
-              <a:schemeClr val="phClr">
-                <a:tint val="80000"/>
-                <a:satMod val="300000"/>
-              </a:schemeClr>
-            </a:gs>
-            <a:gs pos="100000">
-              <a:schemeClr val="phClr">
-                <a:shade val="30000"/>
-                <a:satMod val="200000"/>
-              </a:schemeClr>
-            </a:gs>
-          </a:gsLst>
-          <a:path path="circle">
-            <a:fillToRect l="50000" t="50000" r="50000" b="50000"/>
-          </a:path>
-        </a:gradFill>
-      </a:bgFillStyleLst>
-    </a:fmtScheme>
-  </a:themeElements>
-</a:theme>
 </file>
</xml_diff>